<commit_message>
Final Design Fair Poster Update
</commit_message>
<xml_diff>
--- a/Design Fair/Design_Fair_Poster.pptx
+++ b/Design Fair/Design_Fair_Poster.pptx
@@ -257,7 +257,7 @@
             <a:fld id="{0158C5BC-9A70-462C-B28D-9600239EAC64}" type="datetimeFigureOut">
               <a:rPr lang="en-US" smtClean="0"/>
               <a:pPr/>
-              <a:t>4/5/2016</a:t>
+              <a:t>4/7/2016</a:t>
             </a:fld>
             <a:endParaRPr lang="en-US"/>
           </a:p>
@@ -424,7 +424,7 @@
             <a:fld id="{E6CC2317-6751-4CD4-9995-8782DD78E936}" type="datetimeFigureOut">
               <a:rPr lang="en-US" smtClean="0"/>
               <a:pPr/>
-              <a:t>4/5/2016</a:t>
+              <a:t>4/7/2016</a:t>
             </a:fld>
             <a:endParaRPr lang="en-US" dirty="0"/>
           </a:p>
@@ -741,7 +741,7 @@
           </a:bodyPr>
           <a:lstStyle/>
           <a:p>
-            <a:endParaRPr lang="en-US"/>
+            <a:endParaRPr lang="en-US" dirty="0"/>
           </a:p>
         </p:txBody>
       </p:sp>
@@ -5451,7 +5451,7 @@
               <a:graphicData uri="http://schemas.openxmlformats.org/presentationml/2006/ole">
                 <mc:AlternateContent xmlns:mc="http://schemas.openxmlformats.org/markup-compatibility/2006">
                   <mc:Choice xmlns:v="urn:schemas-microsoft-com:vml" Requires="v">
-                    <p:oleObj spid="_x0000_s1122" name="Image" r:id="rId8" imgW="1828440" imgH="1117440" progId="Photoshop.Image.13">
+                    <p:oleObj spid="_x0000_s1162" name="Image" r:id="rId8" imgW="1828440" imgH="1117440" progId="Photoshop.Image.13">
                       <p:embed/>
                     </p:oleObj>
                   </mc:Choice>
@@ -5508,7 +5508,7 @@
               <a:graphicData uri="http://schemas.openxmlformats.org/presentationml/2006/ole">
                 <mc:AlternateContent xmlns:mc="http://schemas.openxmlformats.org/markup-compatibility/2006">
                   <mc:Choice xmlns:v="urn:schemas-microsoft-com:vml" Requires="v">
-                    <p:oleObj spid="_x0000_s1123" name="Image" r:id="rId10" imgW="1828440" imgH="1117440" progId="Photoshop.Image.13">
+                    <p:oleObj spid="_x0000_s1163" name="Image" r:id="rId10" imgW="1828440" imgH="1117440" progId="Photoshop.Image.13">
                       <p:embed/>
                     </p:oleObj>
                   </mc:Choice>
@@ -6636,7 +6636,7 @@
             <a:graphicData uri="http://schemas.openxmlformats.org/presentationml/2006/ole">
               <mc:AlternateContent xmlns:mc="http://schemas.openxmlformats.org/markup-compatibility/2006">
                 <mc:Choice xmlns:v="urn:schemas-microsoft-com:vml" Requires="v">
-                  <p:oleObj spid="_x0000_s1124" name="Image" r:id="rId12" imgW="4571280" imgH="1688760" progId="Photoshop.Image.13">
+                  <p:oleObj spid="_x0000_s1164" name="Image" r:id="rId12" imgW="4571280" imgH="1688760" progId="Photoshop.Image.13">
                     <p:embed/>
                   </p:oleObj>
                 </mc:Choice>
@@ -6720,7 +6720,7 @@
             <a:graphicData uri="http://schemas.openxmlformats.org/presentationml/2006/ole">
               <mc:AlternateContent xmlns:mc="http://schemas.openxmlformats.org/markup-compatibility/2006">
                 <mc:Choice xmlns:v="urn:schemas-microsoft-com:vml" Requires="v">
-                  <p:oleObj spid="_x0000_s1125" name="Image" r:id="rId15" imgW="1574280" imgH="1053720" progId="Photoshop.Image.13">
+                  <p:oleObj spid="_x0000_s1165" name="Image" r:id="rId15" imgW="1574280" imgH="1053720" progId="Photoshop.Image.13">
                     <p:embed/>
                   </p:oleObj>
                 </mc:Choice>
@@ -8717,7 +8717,7 @@
             <a:graphicData uri="http://schemas.openxmlformats.org/presentationml/2006/ole">
               <mc:AlternateContent xmlns:mc="http://schemas.openxmlformats.org/markup-compatibility/2006">
                 <mc:Choice xmlns:v="urn:schemas-microsoft-com:vml" Requires="v">
-                  <p:oleObj spid="_x0000_s2150" name="Image" r:id="rId4" imgW="4571280" imgH="1688760" progId="Photoshop.Image.13">
+                  <p:oleObj spid="_x0000_s2190" name="Image" r:id="rId4" imgW="4571280" imgH="1688760" progId="Photoshop.Image.13">
                     <p:embed/>
                   </p:oleObj>
                 </mc:Choice>
@@ -8801,7 +8801,7 @@
             <a:graphicData uri="http://schemas.openxmlformats.org/presentationml/2006/ole">
               <mc:AlternateContent xmlns:mc="http://schemas.openxmlformats.org/markup-compatibility/2006">
                 <mc:Choice xmlns:v="urn:schemas-microsoft-com:vml" Requires="v">
-                  <p:oleObj spid="_x0000_s2151" name="Image" r:id="rId7" imgW="1574280" imgH="1053720" progId="Photoshop.Image.13">
+                  <p:oleObj spid="_x0000_s2191" name="Image" r:id="rId7" imgW="1574280" imgH="1053720" progId="Photoshop.Image.13">
                     <p:embed/>
                   </p:oleObj>
                 </mc:Choice>
@@ -10341,7 +10341,7 @@
               <a:graphicData uri="http://schemas.openxmlformats.org/presentationml/2006/ole">
                 <mc:AlternateContent xmlns:mc="http://schemas.openxmlformats.org/markup-compatibility/2006">
                   <mc:Choice xmlns:v="urn:schemas-microsoft-com:vml" Requires="v">
-                    <p:oleObj spid="_x0000_s2152" name="Image" r:id="rId15" imgW="1828440" imgH="1117440" progId="Photoshop.Image.13">
+                    <p:oleObj spid="_x0000_s2192" name="Image" r:id="rId15" imgW="1828440" imgH="1117440" progId="Photoshop.Image.13">
                       <p:embed/>
                     </p:oleObj>
                   </mc:Choice>
@@ -10398,7 +10398,7 @@
               <a:graphicData uri="http://schemas.openxmlformats.org/presentationml/2006/ole">
                 <mc:AlternateContent xmlns:mc="http://schemas.openxmlformats.org/markup-compatibility/2006">
                   <mc:Choice xmlns:v="urn:schemas-microsoft-com:vml" Requires="v">
-                    <p:oleObj spid="_x0000_s2153" name="Image" r:id="rId17" imgW="1828440" imgH="1117440" progId="Photoshop.Image.13">
+                    <p:oleObj spid="_x0000_s2193" name="Image" r:id="rId17" imgW="1828440" imgH="1117440" progId="Photoshop.Image.13">
                       <p:embed/>
                     </p:oleObj>
                   </mc:Choice>
@@ -12226,7 +12226,7 @@
             <a:graphicData uri="http://schemas.openxmlformats.org/presentationml/2006/ole">
               <mc:AlternateContent xmlns:mc="http://schemas.openxmlformats.org/markup-compatibility/2006">
                 <mc:Choice xmlns:v="urn:schemas-microsoft-com:vml" Requires="v">
-                  <p:oleObj spid="_x0000_s3170" name="Image" r:id="rId4" imgW="4571280" imgH="1688760" progId="Photoshop.Image.13">
+                  <p:oleObj spid="_x0000_s3210" name="Image" r:id="rId4" imgW="4571280" imgH="1688760" progId="Photoshop.Image.13">
                     <p:embed/>
                   </p:oleObj>
                 </mc:Choice>
@@ -12310,7 +12310,7 @@
             <a:graphicData uri="http://schemas.openxmlformats.org/presentationml/2006/ole">
               <mc:AlternateContent xmlns:mc="http://schemas.openxmlformats.org/markup-compatibility/2006">
                 <mc:Choice xmlns:v="urn:schemas-microsoft-com:vml" Requires="v">
-                  <p:oleObj spid="_x0000_s3171" name="Image" r:id="rId7" imgW="1574280" imgH="1053720" progId="Photoshop.Image.13">
+                  <p:oleObj spid="_x0000_s3211" name="Image" r:id="rId7" imgW="1574280" imgH="1053720" progId="Photoshop.Image.13">
                     <p:embed/>
                   </p:oleObj>
                 </mc:Choice>
@@ -13850,7 +13850,7 @@
               <a:graphicData uri="http://schemas.openxmlformats.org/presentationml/2006/ole">
                 <mc:AlternateContent xmlns:mc="http://schemas.openxmlformats.org/markup-compatibility/2006">
                   <mc:Choice xmlns:v="urn:schemas-microsoft-com:vml" Requires="v">
-                    <p:oleObj spid="_x0000_s3172" name="Image" r:id="rId15" imgW="1828440" imgH="1117440" progId="Photoshop.Image.13">
+                    <p:oleObj spid="_x0000_s3212" name="Image" r:id="rId15" imgW="1828440" imgH="1117440" progId="Photoshop.Image.13">
                       <p:embed/>
                     </p:oleObj>
                   </mc:Choice>
@@ -13907,7 +13907,7 @@
               <a:graphicData uri="http://schemas.openxmlformats.org/presentationml/2006/ole">
                 <mc:AlternateContent xmlns:mc="http://schemas.openxmlformats.org/markup-compatibility/2006">
                   <mc:Choice xmlns:v="urn:schemas-microsoft-com:vml" Requires="v">
-                    <p:oleObj spid="_x0000_s3173" name="Image" r:id="rId17" imgW="1828440" imgH="1117440" progId="Photoshop.Image.13">
+                    <p:oleObj spid="_x0000_s3213" name="Image" r:id="rId17" imgW="1828440" imgH="1117440" progId="Photoshop.Image.13">
                       <p:embed/>
                     </p:oleObj>
                   </mc:Choice>
@@ -14529,43 +14529,15 @@
             </a:r>
             <a:r>
               <a:rPr lang="en-US" sz="6600" dirty="0" smtClean="0"/>
-              <a:t>effective management tool to replace </a:t>
+              <a:t>effective management tool to replace the outdated system </a:t>
+            </a:r>
+            <a:r>
+              <a:rPr lang="en-US" sz="6600" dirty="0"/>
+              <a:t>currently in use at the A</a:t>
             </a:r>
             <a:r>
               <a:rPr lang="en-US" sz="6600" dirty="0" smtClean="0"/>
-              <a:t>the outdated system</a:t>
-            </a:r>
-            <a:r>
-              <a:rPr lang="en-US" sz="6600" dirty="0" smtClean="0"/>
-              <a:t> </a:t>
-            </a:r>
-            <a:r>
-              <a:rPr lang="en-US" sz="6600" dirty="0"/>
-              <a:t>currently in use at the </a:t>
-            </a:r>
-            <a:r>
-              <a:rPr lang="en-US" sz="6600" dirty="0"/>
-              <a:t>A</a:t>
-            </a:r>
-            <a:r>
-              <a:rPr lang="en-US" sz="6600" dirty="0" smtClean="0"/>
-              <a:t>cademy. </a:t>
-            </a:r>
-            <a:r>
-              <a:rPr lang="en-US" sz="6600" dirty="0" smtClean="0"/>
-              <a:t>This way</a:t>
-            </a:r>
-            <a:r>
-              <a:rPr lang="en-US" sz="6600" dirty="0" smtClean="0"/>
-              <a:t> </a:t>
-            </a:r>
-            <a:r>
-              <a:rPr lang="en-US" sz="6600" dirty="0" smtClean="0"/>
-              <a:t>the </a:t>
-            </a:r>
-            <a:r>
-              <a:rPr lang="en-US" sz="6600" dirty="0" smtClean="0"/>
-              <a:t>users spend </a:t>
+              <a:t>cademy. This way the users spend </a:t>
             </a:r>
             <a:r>
               <a:rPr lang="en-US" sz="6600" dirty="0"/>
@@ -14581,11 +14553,7 @@
             </a:r>
             <a:r>
               <a:rPr lang="en-US" sz="6600" dirty="0" smtClean="0"/>
-              <a:t>teaching the </a:t>
-            </a:r>
-            <a:r>
-              <a:rPr lang="en-US" sz="6600" dirty="0" smtClean="0"/>
-              <a:t>wonders of dance.</a:t>
+              <a:t>teaching the wonders of dance.</a:t>
             </a:r>
             <a:endParaRPr lang="en-US" sz="6600" dirty="0"/>
           </a:p>
@@ -14641,39 +14609,7 @@
           <a:p>
             <a:r>
               <a:rPr lang="en-US" sz="6000" dirty="0" smtClean="0"/>
-              <a:t>The Academy of Dance </a:t>
-            </a:r>
-            <a:r>
-              <a:rPr lang="en-US" sz="6000" dirty="0" smtClean="0"/>
-              <a:t>Arts located in </a:t>
-            </a:r>
-            <a:r>
-              <a:rPr lang="en-US" sz="6000" dirty="0" smtClean="0"/>
-              <a:t>Rapid </a:t>
-            </a:r>
-            <a:r>
-              <a:rPr lang="en-US" sz="6000" dirty="0" smtClean="0"/>
-              <a:t>City </a:t>
-            </a:r>
-            <a:r>
-              <a:rPr lang="en-US" sz="6000" dirty="0" smtClean="0"/>
-              <a:t>and Sturgis</a:t>
-            </a:r>
-            <a:r>
-              <a:rPr lang="en-US" sz="6000" dirty="0" smtClean="0"/>
-              <a:t>, provides classes </a:t>
-            </a:r>
-            <a:r>
-              <a:rPr lang="en-US" sz="6000" dirty="0" smtClean="0"/>
-              <a:t>in a variety of </a:t>
-            </a:r>
-            <a:r>
-              <a:rPr lang="en-US" sz="6000" dirty="0" smtClean="0"/>
-              <a:t>dance styles </a:t>
-            </a:r>
-            <a:r>
-              <a:rPr lang="en-US" sz="6000" dirty="0" smtClean="0"/>
-              <a:t>to students of all ages. These classes range from </a:t>
+              <a:t>The Academy of Dance Arts located in Rapid City and Sturgis, provides classes in a variety of dance styles to students of all ages. These classes range from </a:t>
             </a:r>
             <a:r>
               <a:rPr lang="en-US" sz="6000" dirty="0"/>
@@ -14689,23 +14625,7 @@
             </a:r>
             <a:r>
               <a:rPr lang="en-US" sz="6000" dirty="0" smtClean="0"/>
-              <a:t>Ballet, to</a:t>
-            </a:r>
-            <a:r>
-              <a:rPr lang="en-US" sz="6000" dirty="0" smtClean="0"/>
-              <a:t> Tap, </a:t>
-            </a:r>
-            <a:r>
-              <a:rPr lang="en-US" sz="6000" dirty="0" smtClean="0"/>
-              <a:t>Hip-Hop </a:t>
-            </a:r>
-            <a:r>
-              <a:rPr lang="en-US" sz="6000" dirty="0" smtClean="0"/>
-              <a:t>and </a:t>
-            </a:r>
-            <a:r>
-              <a:rPr lang="en-US" sz="6000" dirty="0" smtClean="0"/>
-              <a:t>Jazz.  </a:t>
+              <a:t>Ballet, to Tap, Hip-Hop and Jazz.  </a:t>
             </a:r>
             <a:endParaRPr lang="en-US" sz="6000" dirty="0"/>
           </a:p>
@@ -14876,15 +14796,15 @@
         </p:spPr>
         <p:txBody>
           <a:bodyPr>
-            <a:normAutofit fontScale="92500" lnSpcReduction="10000"/>
+            <a:noAutofit/>
           </a:bodyPr>
           <a:lstStyle/>
           <a:p>
             <a:r>
-              <a:rPr lang="en-US" dirty="0" err="1" smtClean="0"/>
+              <a:rPr lang="en-US" sz="11000" dirty="0" err="1" smtClean="0"/>
               <a:t>DanceSoft</a:t>
             </a:r>
-            <a:endParaRPr lang="en-US" dirty="0"/>
+            <a:endParaRPr lang="en-US" sz="11000" dirty="0"/>
           </a:p>
         </p:txBody>
       </p:sp>
@@ -15105,7 +15025,7 @@
       </p:sp>
       <p:pic>
         <p:nvPicPr>
-          <p:cNvPr id="20" name="Picture 19"/>
+          <p:cNvPr id="21" name="Picture 20"/>
           <p:cNvPicPr>
             <a:picLocks noChangeAspect="1"/>
           </p:cNvPicPr>
@@ -15125,38 +15045,8 @@
         </p:blipFill>
         <p:spPr>
           <a:xfrm>
-            <a:off x="30764347" y="14013450"/>
-            <a:ext cx="10665363" cy="7448814"/>
-          </a:xfrm>
-          <a:prstGeom prst="rect">
-            <a:avLst/>
-          </a:prstGeom>
-        </p:spPr>
-      </p:pic>
-      <p:pic>
-        <p:nvPicPr>
-          <p:cNvPr id="21" name="Picture 20"/>
-          <p:cNvPicPr>
-            <a:picLocks noChangeAspect="1"/>
-          </p:cNvPicPr>
-          <p:nvPr/>
-        </p:nvPicPr>
-        <p:blipFill>
-          <a:blip r:embed="rId5">
-            <a:extLst>
-              <a:ext uri="{28A0092B-C50C-407E-A947-70E740481C1C}">
-                <a14:useLocalDpi xmlns:a14="http://schemas.microsoft.com/office/drawing/2010/main" val="0"/>
-              </a:ext>
-            </a:extLst>
-          </a:blip>
-          <a:stretch>
-            <a:fillRect/>
-          </a:stretch>
-        </p:blipFill>
-        <p:spPr>
-          <a:xfrm>
-            <a:off x="1459936" y="11094443"/>
-            <a:ext cx="11303968" cy="8933100"/>
+            <a:off x="1333275" y="11094443"/>
+            <a:ext cx="7327792" cy="6510994"/>
           </a:xfrm>
           <a:prstGeom prst="rect">
             <a:avLst/>
@@ -15171,7 +15061,7 @@
         </p:nvSpPr>
         <p:spPr>
           <a:xfrm>
-            <a:off x="754652" y="20405446"/>
+            <a:off x="754652" y="20826644"/>
             <a:ext cx="6357268" cy="1200329"/>
           </a:xfrm>
           <a:prstGeom prst="rect">
@@ -15202,8 +15092,8 @@
         </p:nvSpPr>
         <p:spPr>
           <a:xfrm>
-            <a:off x="29399542" y="21673383"/>
-            <a:ext cx="8336841" cy="1200329"/>
+            <a:off x="29399542" y="22598179"/>
+            <a:ext cx="12073589" cy="1323439"/>
           </a:xfrm>
           <a:prstGeom prst="rect">
             <a:avLst/>
@@ -15218,10 +15108,10 @@
           <a:p>
             <a:pPr algn="ctr"/>
             <a:r>
-              <a:rPr lang="en-US" sz="7200" dirty="0" smtClean="0"/>
-              <a:t>Landing Pages</a:t>
+              <a:rPr lang="en-US" sz="8000" dirty="0" smtClean="0"/>
+              <a:t>Figure 2: Search Pages</a:t>
             </a:r>
-            <a:endParaRPr lang="en-US" sz="7200" dirty="0"/>
+            <a:endParaRPr lang="en-US" sz="8000" dirty="0"/>
           </a:p>
         </p:txBody>
       </p:sp>
@@ -15234,7 +15124,7 @@
           <p:nvPr/>
         </p:nvPicPr>
         <p:blipFill>
-          <a:blip r:embed="rId6">
+          <a:blip r:embed="rId5">
             <a:extLst>
               <a:ext uri="{28A0092B-C50C-407E-A947-70E740481C1C}">
                 <a14:useLocalDpi xmlns:a14="http://schemas.microsoft.com/office/drawing/2010/main" val="0"/>
@@ -15264,7 +15154,7 @@
           <p:nvPr/>
         </p:nvPicPr>
         <p:blipFill>
-          <a:blip r:embed="rId7">
+          <a:blip r:embed="rId6">
             <a:extLst>
               <a:ext uri="{28A0092B-C50C-407E-A947-70E740481C1C}">
                 <a14:useLocalDpi xmlns:a14="http://schemas.microsoft.com/office/drawing/2010/main" val="0"/>
@@ -15294,6 +15184,36 @@
           <p:nvPr/>
         </p:nvPicPr>
         <p:blipFill>
+          <a:blip r:embed="rId7">
+            <a:extLst>
+              <a:ext uri="{28A0092B-C50C-407E-A947-70E740481C1C}">
+                <a14:useLocalDpi xmlns:a14="http://schemas.microsoft.com/office/drawing/2010/main" val="0"/>
+              </a:ext>
+            </a:extLst>
+          </a:blip>
+          <a:stretch>
+            <a:fillRect/>
+          </a:stretch>
+        </p:blipFill>
+        <p:spPr>
+          <a:xfrm>
+            <a:off x="1459936" y="23895891"/>
+            <a:ext cx="12476515" cy="6546523"/>
+          </a:xfrm>
+          <a:prstGeom prst="rect">
+            <a:avLst/>
+          </a:prstGeom>
+        </p:spPr>
+      </p:pic>
+      <p:pic>
+        <p:nvPicPr>
+          <p:cNvPr id="4" name="Picture 3"/>
+          <p:cNvPicPr>
+            <a:picLocks noChangeAspect="1"/>
+          </p:cNvPicPr>
+          <p:nvPr/>
+        </p:nvPicPr>
+        <p:blipFill>
           <a:blip r:embed="rId8">
             <a:extLst>
               <a:ext uri="{28A0092B-C50C-407E-A947-70E740481C1C}">
@@ -15307,8 +15227,136 @@
         </p:blipFill>
         <p:spPr>
           <a:xfrm>
-            <a:off x="1459936" y="22944929"/>
-            <a:ext cx="12476515" cy="6546523"/>
+            <a:off x="8661067" y="11075103"/>
+            <a:ext cx="5566166" cy="6525205"/>
+          </a:xfrm>
+          <a:prstGeom prst="rect">
+            <a:avLst/>
+          </a:prstGeom>
+        </p:spPr>
+      </p:pic>
+      <p:pic>
+        <p:nvPicPr>
+          <p:cNvPr id="5" name="Picture 4"/>
+          <p:cNvPicPr>
+            <a:picLocks noChangeAspect="1"/>
+          </p:cNvPicPr>
+          <p:nvPr/>
+        </p:nvPicPr>
+        <p:blipFill>
+          <a:blip r:embed="rId9">
+            <a:extLst>
+              <a:ext uri="{28A0092B-C50C-407E-A947-70E740481C1C}">
+                <a14:useLocalDpi xmlns:a14="http://schemas.microsoft.com/office/drawing/2010/main" val="0"/>
+              </a:ext>
+            </a:extLst>
+          </a:blip>
+          <a:stretch>
+            <a:fillRect/>
+          </a:stretch>
+        </p:blipFill>
+        <p:spPr>
+          <a:xfrm>
+            <a:off x="1333274" y="17605437"/>
+            <a:ext cx="7327793" cy="4582219"/>
+          </a:xfrm>
+          <a:prstGeom prst="rect">
+            <a:avLst/>
+          </a:prstGeom>
+        </p:spPr>
+      </p:pic>
+      <p:pic>
+        <p:nvPicPr>
+          <p:cNvPr id="12" name="Picture 11"/>
+          <p:cNvPicPr>
+            <a:picLocks noChangeAspect="1"/>
+          </p:cNvPicPr>
+          <p:nvPr/>
+        </p:nvPicPr>
+        <p:blipFill>
+          <a:blip r:embed="rId10">
+            <a:extLst>
+              <a:ext uri="{28A0092B-C50C-407E-A947-70E740481C1C}">
+                <a14:useLocalDpi xmlns:a14="http://schemas.microsoft.com/office/drawing/2010/main" val="0"/>
+              </a:ext>
+            </a:extLst>
+          </a:blip>
+          <a:stretch>
+            <a:fillRect/>
+          </a:stretch>
+        </p:blipFill>
+        <p:spPr>
+          <a:xfrm>
+            <a:off x="8701912" y="17605437"/>
+            <a:ext cx="5525321" cy="4582219"/>
+          </a:xfrm>
+          <a:prstGeom prst="rect">
+            <a:avLst/>
+          </a:prstGeom>
+        </p:spPr>
+      </p:pic>
+      <p:sp>
+        <p:nvSpPr>
+          <p:cNvPr id="13" name="TextBox 12"/>
+          <p:cNvSpPr txBox="1"/>
+          <p:nvPr/>
+        </p:nvSpPr>
+        <p:spPr>
+          <a:xfrm>
+            <a:off x="1584180" y="22358330"/>
+            <a:ext cx="12476514" cy="1323439"/>
+          </a:xfrm>
+          <a:prstGeom prst="rect">
+            <a:avLst/>
+          </a:prstGeom>
+          <a:noFill/>
+        </p:spPr>
+        <p:txBody>
+          <a:bodyPr wrap="square" rtlCol="0">
+            <a:spAutoFit/>
+          </a:bodyPr>
+          <a:lstStyle/>
+          <a:p>
+            <a:r>
+              <a:rPr lang="en-US" sz="8000" dirty="0" smtClean="0"/>
+              <a:t>Figure 1: </a:t>
+            </a:r>
+            <a:r>
+              <a:rPr lang="en-US" sz="8000" dirty="0" err="1" smtClean="0"/>
+              <a:t>PyQt</a:t>
+            </a:r>
+            <a:r>
+              <a:rPr lang="en-US" sz="8000" dirty="0" smtClean="0"/>
+              <a:t> Page Design</a:t>
+            </a:r>
+            <a:endParaRPr lang="en-US" sz="8000" dirty="0"/>
+          </a:p>
+        </p:txBody>
+      </p:sp>
+      <p:pic>
+        <p:nvPicPr>
+          <p:cNvPr id="22" name="Picture 21"/>
+          <p:cNvPicPr>
+            <a:picLocks noChangeAspect="1"/>
+          </p:cNvPicPr>
+          <p:nvPr/>
+        </p:nvPicPr>
+        <p:blipFill>
+          <a:blip r:embed="rId4">
+            <a:extLst>
+              <a:ext uri="{28A0092B-C50C-407E-A947-70E740481C1C}">
+                <a14:useLocalDpi xmlns:a14="http://schemas.microsoft.com/office/drawing/2010/main" val="0"/>
+              </a:ext>
+            </a:extLst>
+          </a:blip>
+          <a:stretch>
+            <a:fillRect/>
+          </a:stretch>
+        </p:blipFill>
+        <p:spPr>
+          <a:xfrm>
+            <a:off x="30720926" y="13966867"/>
+            <a:ext cx="10752205" cy="8497061"/>
           </a:xfrm>
           <a:prstGeom prst="rect">
             <a:avLst/>

</xml_diff>